<commit_message>
add hw to advanced
</commit_message>
<xml_diff>
--- a/src/11-Multithreading/11-Multithreading.pptx
+++ b/src/11-Multithreading/11-Multithreading.pptx
@@ -40,7 +40,9 @@
     <p:sldId id="293" r:id="rId34"/>
     <p:sldId id="295" r:id="rId35"/>
     <p:sldId id="296" r:id="rId36"/>
-    <p:sldId id="258" r:id="rId37"/>
+    <p:sldId id="298" r:id="rId37"/>
+    <p:sldId id="297" r:id="rId38"/>
+    <p:sldId id="258" r:id="rId39"/>
   </p:sldIdLst>
   <p:sldSz cx="12192000" cy="6858000"/>
   <p:notesSz cx="6858000" cy="9144000"/>
@@ -195,6 +197,12 @@
             <p14:sldId id="293"/>
             <p14:sldId id="295"/>
             <p14:sldId id="296"/>
+            <p14:sldId id="298"/>
+          </p14:sldIdLst>
+        </p14:section>
+        <p14:section name="Channels/Mutx" id="{49D87AB3-CD85-4105-969C-A4D3A66B0DD4}">
+          <p14:sldIdLst>
+            <p14:sldId id="297"/>
           </p14:sldIdLst>
         </p14:section>
         <p14:section name="Conclusion" id="{FAAC3CD8-4D89-4EEB-BC6E-FC3060975D43}">
@@ -1293,7 +1301,7 @@
           <a:p>
             <a:fld id="{EFAAC8F1-21AA-47EF-82D9-7929EA07D29D}" type="datetimeFigureOut">
               <a:rPr lang="ru-RU" smtClean="0"/>
-              <a:t>16.04.2023</a:t>
+              <a:t>18.04.2023</a:t>
             </a:fld>
             <a:endParaRPr lang="ru-RU"/>
           </a:p>
@@ -1493,7 +1501,7 @@
           <a:p>
             <a:fld id="{EFAAC8F1-21AA-47EF-82D9-7929EA07D29D}" type="datetimeFigureOut">
               <a:rPr lang="ru-RU" smtClean="0"/>
-              <a:t>16.04.2023</a:t>
+              <a:t>18.04.2023</a:t>
             </a:fld>
             <a:endParaRPr lang="ru-RU"/>
           </a:p>
@@ -1703,7 +1711,7 @@
           <a:p>
             <a:fld id="{EFAAC8F1-21AA-47EF-82D9-7929EA07D29D}" type="datetimeFigureOut">
               <a:rPr lang="ru-RU" smtClean="0"/>
-              <a:t>16.04.2023</a:t>
+              <a:t>18.04.2023</a:t>
             </a:fld>
             <a:endParaRPr lang="ru-RU"/>
           </a:p>
@@ -1903,7 +1911,7 @@
           <a:p>
             <a:fld id="{EFAAC8F1-21AA-47EF-82D9-7929EA07D29D}" type="datetimeFigureOut">
               <a:rPr lang="ru-RU" smtClean="0"/>
-              <a:t>16.04.2023</a:t>
+              <a:t>18.04.2023</a:t>
             </a:fld>
             <a:endParaRPr lang="ru-RU"/>
           </a:p>
@@ -2179,7 +2187,7 @@
           <a:p>
             <a:fld id="{EFAAC8F1-21AA-47EF-82D9-7929EA07D29D}" type="datetimeFigureOut">
               <a:rPr lang="ru-RU" smtClean="0"/>
-              <a:t>16.04.2023</a:t>
+              <a:t>18.04.2023</a:t>
             </a:fld>
             <a:endParaRPr lang="ru-RU"/>
           </a:p>
@@ -2447,7 +2455,7 @@
           <a:p>
             <a:fld id="{EFAAC8F1-21AA-47EF-82D9-7929EA07D29D}" type="datetimeFigureOut">
               <a:rPr lang="ru-RU" smtClean="0"/>
-              <a:t>16.04.2023</a:t>
+              <a:t>18.04.2023</a:t>
             </a:fld>
             <a:endParaRPr lang="ru-RU"/>
           </a:p>
@@ -2862,7 +2870,7 @@
           <a:p>
             <a:fld id="{EFAAC8F1-21AA-47EF-82D9-7929EA07D29D}" type="datetimeFigureOut">
               <a:rPr lang="ru-RU" smtClean="0"/>
-              <a:t>16.04.2023</a:t>
+              <a:t>18.04.2023</a:t>
             </a:fld>
             <a:endParaRPr lang="ru-RU"/>
           </a:p>
@@ -3004,7 +3012,7 @@
           <a:p>
             <a:fld id="{EFAAC8F1-21AA-47EF-82D9-7929EA07D29D}" type="datetimeFigureOut">
               <a:rPr lang="ru-RU" smtClean="0"/>
-              <a:t>16.04.2023</a:t>
+              <a:t>18.04.2023</a:t>
             </a:fld>
             <a:endParaRPr lang="ru-RU"/>
           </a:p>
@@ -3117,7 +3125,7 @@
           <a:p>
             <a:fld id="{EFAAC8F1-21AA-47EF-82D9-7929EA07D29D}" type="datetimeFigureOut">
               <a:rPr lang="ru-RU" smtClean="0"/>
-              <a:t>16.04.2023</a:t>
+              <a:t>18.04.2023</a:t>
             </a:fld>
             <a:endParaRPr lang="ru-RU"/>
           </a:p>
@@ -3430,7 +3438,7 @@
           <a:p>
             <a:fld id="{EFAAC8F1-21AA-47EF-82D9-7929EA07D29D}" type="datetimeFigureOut">
               <a:rPr lang="ru-RU" smtClean="0"/>
-              <a:t>16.04.2023</a:t>
+              <a:t>18.04.2023</a:t>
             </a:fld>
             <a:endParaRPr lang="ru-RU"/>
           </a:p>
@@ -3719,7 +3727,7 @@
           <a:p>
             <a:fld id="{EFAAC8F1-21AA-47EF-82D9-7929EA07D29D}" type="datetimeFigureOut">
               <a:rPr lang="ru-RU" smtClean="0"/>
-              <a:t>16.04.2023</a:t>
+              <a:t>18.04.2023</a:t>
             </a:fld>
             <a:endParaRPr lang="ru-RU"/>
           </a:p>
@@ -3962,7 +3970,7 @@
           <a:p>
             <a:fld id="{EFAAC8F1-21AA-47EF-82D9-7929EA07D29D}" type="datetimeFigureOut">
               <a:rPr lang="ru-RU" smtClean="0"/>
-              <a:t>16.04.2023</a:t>
+              <a:t>18.04.2023</a:t>
             </a:fld>
             <a:endParaRPr lang="ru-RU"/>
           </a:p>
@@ -16254,8 +16262,8 @@
           </a:p>
         </p:txBody>
       </p:sp>
-      <mc:AlternateContent xmlns:mc="http://schemas.openxmlformats.org/markup-compatibility/2006">
-        <mc:Choice xmlns:p14="http://schemas.microsoft.com/office/powerpoint/2010/main" Requires="p14">
+      <mc:AlternateContent xmlns:mc="http://schemas.openxmlformats.org/markup-compatibility/2006" xmlns:p14="http://schemas.microsoft.com/office/powerpoint/2010/main">
+        <mc:Choice Requires="p14">
           <p:contentPart p14:bwMode="auto" r:id="rId2">
             <p14:nvContentPartPr>
               <p14:cNvPr id="5" name="Ink 4">
@@ -16274,7 +16282,7 @@
             </p14:xfrm>
           </p:contentPart>
         </mc:Choice>
-        <mc:Fallback>
+        <mc:Fallback xmlns="">
           <p:pic>
             <p:nvPicPr>
               <p:cNvPr id="5" name="Ink 4">
@@ -16325,8 +16333,8 @@
             <a:chExt cx="301320" cy="86040"/>
           </a:xfrm>
         </p:grpSpPr>
-        <mc:AlternateContent xmlns:mc="http://schemas.openxmlformats.org/markup-compatibility/2006">
-          <mc:Choice xmlns:p14="http://schemas.microsoft.com/office/powerpoint/2010/main" Requires="p14">
+        <mc:AlternateContent xmlns:mc="http://schemas.openxmlformats.org/markup-compatibility/2006" xmlns:p14="http://schemas.microsoft.com/office/powerpoint/2010/main">
+          <mc:Choice Requires="p14">
             <p:contentPart p14:bwMode="auto" r:id="rId4">
               <p14:nvContentPartPr>
                 <p14:cNvPr id="6" name="Ink 5">
@@ -16345,7 +16353,7 @@
               </p14:xfrm>
             </p:contentPart>
           </mc:Choice>
-          <mc:Fallback>
+          <mc:Fallback xmlns="">
             <p:pic>
               <p:nvPicPr>
                 <p:cNvPr id="6" name="Ink 5">
@@ -16376,8 +16384,8 @@
             </p:pic>
           </mc:Fallback>
         </mc:AlternateContent>
-        <mc:AlternateContent xmlns:mc="http://schemas.openxmlformats.org/markup-compatibility/2006">
-          <mc:Choice xmlns:p14="http://schemas.microsoft.com/office/powerpoint/2010/main" Requires="p14">
+        <mc:AlternateContent xmlns:mc="http://schemas.openxmlformats.org/markup-compatibility/2006" xmlns:p14="http://schemas.microsoft.com/office/powerpoint/2010/main">
+          <mc:Choice Requires="p14">
             <p:contentPart p14:bwMode="auto" r:id="rId6">
               <p14:nvContentPartPr>
                 <p14:cNvPr id="7" name="Ink 6">
@@ -16396,7 +16404,7 @@
               </p14:xfrm>
             </p:contentPart>
           </mc:Choice>
-          <mc:Fallback>
+          <mc:Fallback xmlns="">
             <p:pic>
               <p:nvPicPr>
                 <p:cNvPr id="7" name="Ink 6">
@@ -16428,8 +16436,8 @@
           </mc:Fallback>
         </mc:AlternateContent>
       </p:grpSp>
-      <mc:AlternateContent xmlns:mc="http://schemas.openxmlformats.org/markup-compatibility/2006">
-        <mc:Choice xmlns:p14="http://schemas.microsoft.com/office/powerpoint/2010/main" Requires="p14">
+      <mc:AlternateContent xmlns:mc="http://schemas.openxmlformats.org/markup-compatibility/2006" xmlns:p14="http://schemas.microsoft.com/office/powerpoint/2010/main">
+        <mc:Choice Requires="p14">
           <p:contentPart p14:bwMode="auto" r:id="rId8">
             <p14:nvContentPartPr>
               <p14:cNvPr id="10" name="Ink 9">
@@ -16448,7 +16456,7 @@
             </p14:xfrm>
           </p:contentPart>
         </mc:Choice>
-        <mc:Fallback>
+        <mc:Fallback xmlns="">
           <p:pic>
             <p:nvPicPr>
               <p:cNvPr id="10" name="Ink 9">
@@ -16499,8 +16507,8 @@
             <a:chExt cx="387000" cy="183960"/>
           </a:xfrm>
         </p:grpSpPr>
-        <mc:AlternateContent xmlns:mc="http://schemas.openxmlformats.org/markup-compatibility/2006">
-          <mc:Choice xmlns:p14="http://schemas.microsoft.com/office/powerpoint/2010/main" Requires="p14">
+        <mc:AlternateContent xmlns:mc="http://schemas.openxmlformats.org/markup-compatibility/2006" xmlns:p14="http://schemas.microsoft.com/office/powerpoint/2010/main">
+          <mc:Choice Requires="p14">
             <p:contentPart p14:bwMode="auto" r:id="rId10">
               <p14:nvContentPartPr>
                 <p14:cNvPr id="11" name="Ink 10">
@@ -16519,7 +16527,7 @@
               </p14:xfrm>
             </p:contentPart>
           </mc:Choice>
-          <mc:Fallback>
+          <mc:Fallback xmlns="">
             <p:pic>
               <p:nvPicPr>
                 <p:cNvPr id="11" name="Ink 10">
@@ -16550,8 +16558,8 @@
             </p:pic>
           </mc:Fallback>
         </mc:AlternateContent>
-        <mc:AlternateContent xmlns:mc="http://schemas.openxmlformats.org/markup-compatibility/2006">
-          <mc:Choice xmlns:p14="http://schemas.microsoft.com/office/powerpoint/2010/main" Requires="p14">
+        <mc:AlternateContent xmlns:mc="http://schemas.openxmlformats.org/markup-compatibility/2006" xmlns:p14="http://schemas.microsoft.com/office/powerpoint/2010/main">
+          <mc:Choice Requires="p14">
             <p:contentPart p14:bwMode="auto" r:id="rId12">
               <p14:nvContentPartPr>
                 <p14:cNvPr id="12" name="Ink 11">
@@ -16570,7 +16578,7 @@
               </p14:xfrm>
             </p:contentPart>
           </mc:Choice>
-          <mc:Fallback>
+          <mc:Fallback xmlns="">
             <p:pic>
               <p:nvPicPr>
                 <p:cNvPr id="12" name="Ink 11">
@@ -22250,8 +22258,8 @@
           </a:p>
         </p:txBody>
       </p:sp>
-      <mc:AlternateContent xmlns:mc="http://schemas.openxmlformats.org/markup-compatibility/2006">
-        <mc:Choice xmlns:p14="http://schemas.microsoft.com/office/powerpoint/2010/main" Requires="p14">
+      <mc:AlternateContent xmlns:mc="http://schemas.openxmlformats.org/markup-compatibility/2006" xmlns:p14="http://schemas.microsoft.com/office/powerpoint/2010/main">
+        <mc:Choice Requires="p14">
           <p:contentPart p14:bwMode="auto" r:id="rId2">
             <p14:nvContentPartPr>
               <p14:cNvPr id="16" name="Ink 15">
@@ -22270,7 +22278,7 @@
             </p14:xfrm>
           </p:contentPart>
         </mc:Choice>
-        <mc:Fallback>
+        <mc:Fallback xmlns="">
           <p:pic>
             <p:nvPicPr>
               <p:cNvPr id="16" name="Ink 15">
@@ -22301,8 +22309,8 @@
           </p:pic>
         </mc:Fallback>
       </mc:AlternateContent>
-      <mc:AlternateContent xmlns:mc="http://schemas.openxmlformats.org/markup-compatibility/2006">
-        <mc:Choice xmlns:p14="http://schemas.microsoft.com/office/powerpoint/2010/main" Requires="p14">
+      <mc:AlternateContent xmlns:mc="http://schemas.openxmlformats.org/markup-compatibility/2006" xmlns:p14="http://schemas.microsoft.com/office/powerpoint/2010/main">
+        <mc:Choice Requires="p14">
           <p:contentPart p14:bwMode="auto" r:id="rId4">
             <p14:nvContentPartPr>
               <p14:cNvPr id="17" name="Ink 16">
@@ -22321,7 +22329,7 @@
             </p14:xfrm>
           </p:contentPart>
         </mc:Choice>
-        <mc:Fallback>
+        <mc:Fallback xmlns="">
           <p:pic>
             <p:nvPicPr>
               <p:cNvPr id="17" name="Ink 16">
@@ -22372,8 +22380,8 @@
             <a:chExt cx="757800" cy="327960"/>
           </a:xfrm>
         </p:grpSpPr>
-        <mc:AlternateContent xmlns:mc="http://schemas.openxmlformats.org/markup-compatibility/2006">
-          <mc:Choice xmlns:p14="http://schemas.microsoft.com/office/powerpoint/2010/main" Requires="p14">
+        <mc:AlternateContent xmlns:mc="http://schemas.openxmlformats.org/markup-compatibility/2006" xmlns:p14="http://schemas.microsoft.com/office/powerpoint/2010/main">
+          <mc:Choice Requires="p14">
             <p:contentPart p14:bwMode="auto" r:id="rId6">
               <p14:nvContentPartPr>
                 <p14:cNvPr id="18" name="Ink 17">
@@ -22392,7 +22400,7 @@
               </p14:xfrm>
             </p:contentPart>
           </mc:Choice>
-          <mc:Fallback>
+          <mc:Fallback xmlns="">
             <p:pic>
               <p:nvPicPr>
                 <p:cNvPr id="18" name="Ink 17">
@@ -22423,8 +22431,8 @@
             </p:pic>
           </mc:Fallback>
         </mc:AlternateContent>
-        <mc:AlternateContent xmlns:mc="http://schemas.openxmlformats.org/markup-compatibility/2006">
-          <mc:Choice xmlns:p14="http://schemas.microsoft.com/office/powerpoint/2010/main" Requires="p14">
+        <mc:AlternateContent xmlns:mc="http://schemas.openxmlformats.org/markup-compatibility/2006" xmlns:p14="http://schemas.microsoft.com/office/powerpoint/2010/main">
+          <mc:Choice Requires="p14">
             <p:contentPart p14:bwMode="auto" r:id="rId8">
               <p14:nvContentPartPr>
                 <p14:cNvPr id="19" name="Ink 18">
@@ -22443,7 +22451,7 @@
               </p14:xfrm>
             </p:contentPart>
           </mc:Choice>
-          <mc:Fallback>
+          <mc:Fallback xmlns="">
             <p:pic>
               <p:nvPicPr>
                 <p:cNvPr id="19" name="Ink 18">
@@ -22495,8 +22503,8 @@
             <a:chExt cx="546120" cy="359640"/>
           </a:xfrm>
         </p:grpSpPr>
-        <mc:AlternateContent xmlns:mc="http://schemas.openxmlformats.org/markup-compatibility/2006">
-          <mc:Choice xmlns:p14="http://schemas.microsoft.com/office/powerpoint/2010/main" Requires="p14">
+        <mc:AlternateContent xmlns:mc="http://schemas.openxmlformats.org/markup-compatibility/2006" xmlns:p14="http://schemas.microsoft.com/office/powerpoint/2010/main">
+          <mc:Choice Requires="p14">
             <p:contentPart p14:bwMode="auto" r:id="rId10">
               <p14:nvContentPartPr>
                 <p14:cNvPr id="21" name="Ink 20">
@@ -22515,7 +22523,7 @@
               </p14:xfrm>
             </p:contentPart>
           </mc:Choice>
-          <mc:Fallback>
+          <mc:Fallback xmlns="">
             <p:pic>
               <p:nvPicPr>
                 <p:cNvPr id="21" name="Ink 20">
@@ -22546,8 +22554,8 @@
             </p:pic>
           </mc:Fallback>
         </mc:AlternateContent>
-        <mc:AlternateContent xmlns:mc="http://schemas.openxmlformats.org/markup-compatibility/2006">
-          <mc:Choice xmlns:p14="http://schemas.microsoft.com/office/powerpoint/2010/main" Requires="p14">
+        <mc:AlternateContent xmlns:mc="http://schemas.openxmlformats.org/markup-compatibility/2006" xmlns:p14="http://schemas.microsoft.com/office/powerpoint/2010/main">
+          <mc:Choice Requires="p14">
             <p:contentPart p14:bwMode="auto" r:id="rId12">
               <p14:nvContentPartPr>
                 <p14:cNvPr id="22" name="Ink 21">
@@ -22566,7 +22574,7 @@
               </p14:xfrm>
             </p:contentPart>
           </mc:Choice>
-          <mc:Fallback>
+          <mc:Fallback xmlns="">
             <p:pic>
               <p:nvPicPr>
                 <p:cNvPr id="22" name="Ink 21">
@@ -25738,6 +25746,170 @@
           <p:cNvPr id="2" name="Title 1">
             <a:extLst>
               <a:ext uri="{FF2B5EF4-FFF2-40B4-BE49-F238E27FC236}">
+                <a16:creationId xmlns:a16="http://schemas.microsoft.com/office/drawing/2014/main" id="{8DF0E1FE-340D-3A27-2BE2-E0434FDFAB0D}"/>
+              </a:ext>
+            </a:extLst>
+          </p:cNvPr>
+          <p:cNvSpPr>
+            <a:spLocks noGrp="1"/>
+          </p:cNvSpPr>
+          <p:nvPr>
+            <p:ph type="title"/>
+          </p:nvPr>
+        </p:nvSpPr>
+        <p:spPr/>
+        <p:txBody>
+          <a:bodyPr/>
+          <a:lstStyle/>
+          <a:p>
+            <a:r>
+              <a:rPr lang="en-US"/>
+              <a:t>Arc</a:t>
+            </a:r>
+            <a:endParaRPr lang="ru-RU"/>
+          </a:p>
+        </p:txBody>
+      </p:sp>
+      <p:sp>
+        <p:nvSpPr>
+          <p:cNvPr id="3" name="Content Placeholder 2">
+            <a:extLst>
+              <a:ext uri="{FF2B5EF4-FFF2-40B4-BE49-F238E27FC236}">
+                <a16:creationId xmlns:a16="http://schemas.microsoft.com/office/drawing/2014/main" id="{72D381AF-AE1E-83CB-BC54-B5D8AF559D05}"/>
+              </a:ext>
+            </a:extLst>
+          </p:cNvPr>
+          <p:cNvSpPr>
+            <a:spLocks noGrp="1"/>
+          </p:cNvSpPr>
+          <p:nvPr>
+            <p:ph idx="1"/>
+          </p:nvPr>
+        </p:nvSpPr>
+        <p:spPr/>
+        <p:txBody>
+          <a:bodyPr/>
+          <a:lstStyle/>
+          <a:p>
+            <a:endParaRPr lang="ru-RU"/>
+          </a:p>
+        </p:txBody>
+      </p:sp>
+    </p:spTree>
+    <p:extLst>
+      <p:ext uri="{BB962C8B-B14F-4D97-AF65-F5344CB8AC3E}">
+        <p14:creationId xmlns:p14="http://schemas.microsoft.com/office/powerpoint/2010/main" val="3102880158"/>
+      </p:ext>
+    </p:extLst>
+  </p:cSld>
+  <p:clrMapOvr>
+    <a:masterClrMapping/>
+  </p:clrMapOvr>
+</p:sld>
+</file>
+
+<file path=ppt/slides/slide37.xml><?xml version="1.0" encoding="utf-8"?>
+<p:sld xmlns:a="http://schemas.openxmlformats.org/drawingml/2006/main" xmlns:r="http://schemas.openxmlformats.org/officeDocument/2006/relationships" xmlns:p="http://schemas.openxmlformats.org/presentationml/2006/main">
+  <p:cSld>
+    <p:spTree>
+      <p:nvGrpSpPr>
+        <p:cNvPr id="1" name=""/>
+        <p:cNvGrpSpPr/>
+        <p:nvPr/>
+      </p:nvGrpSpPr>
+      <p:grpSpPr>
+        <a:xfrm>
+          <a:off x="0" y="0"/>
+          <a:ext cx="0" cy="0"/>
+          <a:chOff x="0" y="0"/>
+          <a:chExt cx="0" cy="0"/>
+        </a:xfrm>
+      </p:grpSpPr>
+      <p:sp>
+        <p:nvSpPr>
+          <p:cNvPr id="2" name="Title 1">
+            <a:extLst>
+              <a:ext uri="{FF2B5EF4-FFF2-40B4-BE49-F238E27FC236}">
+                <a16:creationId xmlns:a16="http://schemas.microsoft.com/office/drawing/2014/main" id="{63F1E33E-F7DA-D4B1-0DAE-7B39290167A2}"/>
+              </a:ext>
+            </a:extLst>
+          </p:cNvPr>
+          <p:cNvSpPr>
+            <a:spLocks noGrp="1"/>
+          </p:cNvSpPr>
+          <p:nvPr>
+            <p:ph type="title"/>
+          </p:nvPr>
+        </p:nvSpPr>
+        <p:spPr/>
+        <p:txBody>
+          <a:bodyPr/>
+          <a:lstStyle/>
+          <a:p>
+            <a:endParaRPr lang="ru-RU"/>
+          </a:p>
+        </p:txBody>
+      </p:sp>
+      <p:sp>
+        <p:nvSpPr>
+          <p:cNvPr id="3" name="Content Placeholder 2">
+            <a:extLst>
+              <a:ext uri="{FF2B5EF4-FFF2-40B4-BE49-F238E27FC236}">
+                <a16:creationId xmlns:a16="http://schemas.microsoft.com/office/drawing/2014/main" id="{8E521272-853A-7DCA-4D70-C14CB5AA0DA8}"/>
+              </a:ext>
+            </a:extLst>
+          </p:cNvPr>
+          <p:cNvSpPr>
+            <a:spLocks noGrp="1"/>
+          </p:cNvSpPr>
+          <p:nvPr>
+            <p:ph idx="1"/>
+          </p:nvPr>
+        </p:nvSpPr>
+        <p:spPr/>
+        <p:txBody>
+          <a:bodyPr/>
+          <a:lstStyle/>
+          <a:p>
+            <a:endParaRPr lang="ru-RU"/>
+          </a:p>
+        </p:txBody>
+      </p:sp>
+    </p:spTree>
+    <p:extLst>
+      <p:ext uri="{BB962C8B-B14F-4D97-AF65-F5344CB8AC3E}">
+        <p14:creationId xmlns:p14="http://schemas.microsoft.com/office/powerpoint/2010/main" val="2804306813"/>
+      </p:ext>
+    </p:extLst>
+  </p:cSld>
+  <p:clrMapOvr>
+    <a:masterClrMapping/>
+  </p:clrMapOvr>
+</p:sld>
+</file>
+
+<file path=ppt/slides/slide38.xml><?xml version="1.0" encoding="utf-8"?>
+<p:sld xmlns:a="http://schemas.openxmlformats.org/drawingml/2006/main" xmlns:r="http://schemas.openxmlformats.org/officeDocument/2006/relationships" xmlns:p="http://schemas.openxmlformats.org/presentationml/2006/main">
+  <p:cSld>
+    <p:spTree>
+      <p:nvGrpSpPr>
+        <p:cNvPr id="1" name=""/>
+        <p:cNvGrpSpPr/>
+        <p:nvPr/>
+      </p:nvGrpSpPr>
+      <p:grpSpPr>
+        <a:xfrm>
+          <a:off x="0" y="0"/>
+          <a:ext cx="0" cy="0"/>
+          <a:chOff x="0" y="0"/>
+          <a:chExt cx="0" cy="0"/>
+        </a:xfrm>
+      </p:grpSpPr>
+      <p:sp>
+        <p:nvSpPr>
+          <p:cNvPr id="2" name="Title 1">
+            <a:extLst>
+              <a:ext uri="{FF2B5EF4-FFF2-40B4-BE49-F238E27FC236}">
                 <a16:creationId xmlns:a16="http://schemas.microsoft.com/office/drawing/2014/main" id="{6EAC2F57-76F8-946A-9A2F-91D6B0DFCD10}"/>
               </a:ext>
             </a:extLst>

</xml_diff>